<commit_message>
Updated samples based on 18.3 API release
Updated samples based on 18.3 API release
</commit_message>
<xml_diff>
--- a/Examples/templates/AccessSlides.pptx
+++ b/Examples/templates/AccessSlides.pptx
@@ -130,7 +130,7 @@
   </p:defaultTextStyle>
   <p:extLst>
     <p:ext uri="{EFAFB233-063F-42B5-8137-9DF3F51BA10A}">
-      <p15:sldGuideLst xmlns:p15="http://schemas.microsoft.com/office/powerpoint/2012/main">
+      <p15:sldGuideLst xmlns:p15="http://schemas.microsoft.com/office/powerpoint/2012/main" xmlns="">
         <p15:guide id="1" orient="horz" pos="2160">
           <p15:clr>
             <a:srgbClr val="A4A3A4"/>
@@ -229,7 +229,7 @@
           <a:p>
             <a:fld id="{429852AA-C48A-4FFA-81AB-222B502AE691}" type="datetimeFigureOut">
               <a:rPr lang="en-US" smtClean="0"/>
-              <a:t>6/7/2016</a:t>
+              <a:t>12/30/2017</a:t>
             </a:fld>
             <a:endParaRPr lang="en-US"/>
           </a:p>
@@ -713,7 +713,7 @@
           <a:p>
             <a:fld id="{E8FD0B7A-F5DD-4F40-B4CB-3B2C354B893A}" type="datetimeFigureOut">
               <a:rPr lang="en-US" smtClean="0"/>
-              <a:t>6/7/2016</a:t>
+              <a:t>12/30/2017</a:t>
             </a:fld>
             <a:endParaRPr lang="en-US"/>
           </a:p>
@@ -2268,7 +2268,7 @@
     </a:clrScheme>
     <a:fontScheme name="Office">
       <a:majorFont>
-        <a:latin typeface="Calibri Light" panose="020F0302020204030204"/>
+        <a:latin typeface="Calibri Light"/>
         <a:ea typeface=""/>
         <a:cs typeface=""/>
         <a:font script="Jpan" typeface="ＭＳ Ｐゴシック"/>
@@ -2303,7 +2303,7 @@
         <a:font script="Geor" typeface="Sylfaen"/>
       </a:majorFont>
       <a:minorFont>
-        <a:latin typeface="Calibri" panose="020F0502020204030204"/>
+        <a:latin typeface="Calibri"/>
         <a:ea typeface=""/>
         <a:cs typeface=""/>
         <a:font script="Jpan" typeface="ＭＳ Ｐゴシック"/>
@@ -2480,7 +2480,7 @@
   <a:extraClrSchemeLst/>
   <a:extLst>
     <a:ext uri="{05A4C25C-085E-4340-85A3-A5531E510DB2}">
-      <thm15:themeFamily xmlns:thm15="http://schemas.microsoft.com/office/thememl/2012/main" name="Office Theme" id="{62F939B6-93AF-4DB8-9C6B-D6C7DFDC589F}" vid="{4A3C46E8-61CC-4603-A589-7422A47A8E4A}"/>
+      <thm15:themeFamily xmlns:thm15="http://schemas.microsoft.com/office/thememl/2012/main" xmlns="" name="Office Theme" id="{62F939B6-93AF-4DB8-9C6B-D6C7DFDC589F}" vid="{4A3C46E8-61CC-4603-A589-7422A47A8E4A}"/>
     </a:ext>
   </a:extLst>
 </a:theme>

</xml_diff>